<commit_message>
Criação da versão inicial da apresentação da minha Sprint.
</commit_message>
<xml_diff>
--- a/Dot Project EAP/4. System Management/Apresentacoes/apresentaoV5.pptx
+++ b/Dot Project EAP/4. System Management/Apresentacoes/apresentaoV5.pptx
@@ -5,10 +5,10 @@
     <p:sldMasterId id="2147483648" r:id="rId1"/>
   </p:sldMasterIdLst>
   <p:notesMasterIdLst>
-    <p:notesMasterId r:id="rId16"/>
+    <p:notesMasterId r:id="rId17"/>
   </p:notesMasterIdLst>
   <p:handoutMasterIdLst>
-    <p:handoutMasterId r:id="rId17"/>
+    <p:handoutMasterId r:id="rId18"/>
   </p:handoutMasterIdLst>
   <p:sldIdLst>
     <p:sldId id="256" r:id="rId2"/>
@@ -23,8 +23,9 @@
     <p:sldId id="309" r:id="rId11"/>
     <p:sldId id="306" r:id="rId12"/>
     <p:sldId id="307" r:id="rId13"/>
-    <p:sldId id="311" r:id="rId14"/>
-    <p:sldId id="312" r:id="rId15"/>
+    <p:sldId id="313" r:id="rId14"/>
+    <p:sldId id="311" r:id="rId15"/>
+    <p:sldId id="312" r:id="rId16"/>
   </p:sldIdLst>
   <p:sldSz cx="9144000" cy="6858000" type="screen4x3"/>
   <p:notesSz cx="6858000" cy="9144000"/>
@@ -239,7 +240,7 @@
             <a:fld id="{4D9B6384-752E-4F32-9137-D4556683FD91}" type="datetimeFigureOut">
               <a:rPr lang="pt-BR" smtClean="0"/>
               <a:pPr/>
-              <a:t>07/11/2011</a:t>
+              <a:t>07/11/11</a:t>
             </a:fld>
             <a:endParaRPr lang="pt-BR"/>
           </a:p>
@@ -306,7 +307,7 @@
             <a:fld id="{9C2C2212-C64A-43EB-BDFA-4F0E26E3969B}" type="slidenum">
               <a:rPr lang="pt-BR" smtClean="0"/>
               <a:pPr/>
-              <a:t>‹nº›</a:t>
+              <a:t>‹#›</a:t>
             </a:fld>
             <a:endParaRPr lang="pt-BR"/>
           </a:p>
@@ -406,7 +407,7 @@
             <a:fld id="{C77D3149-F6E6-4DB7-9195-84D964D8F34F}" type="datetimeFigureOut">
               <a:rPr lang="pt-BR" smtClean="0"/>
               <a:pPr/>
-              <a:t>07/11/2011</a:t>
+              <a:t>07/11/11</a:t>
             </a:fld>
             <a:endParaRPr lang="pt-BR"/>
           </a:p>
@@ -566,7 +567,7 @@
             <a:fld id="{6446EFFE-B58C-4860-93DF-B33AA5D3FA1B}" type="slidenum">
               <a:rPr lang="pt-BR" smtClean="0"/>
               <a:pPr/>
-              <a:t>‹nº›</a:t>
+              <a:t>‹#›</a:t>
             </a:fld>
             <a:endParaRPr lang="pt-BR"/>
           </a:p>
@@ -1189,6 +1190,91 @@
 </p:notes>
 </file>
 
+<file path=ppt/notesSlides/notesSlide15.xml><?xml version="1.0" encoding="utf-8"?>
+<p:notes xmlns:a="http://schemas.openxmlformats.org/drawingml/2006/main" xmlns:r="http://schemas.openxmlformats.org/officeDocument/2006/relationships" xmlns:p="http://schemas.openxmlformats.org/presentationml/2006/main">
+  <p:cSld>
+    <p:spTree>
+      <p:nvGrpSpPr>
+        <p:cNvPr id="1" name=""/>
+        <p:cNvGrpSpPr/>
+        <p:nvPr/>
+      </p:nvGrpSpPr>
+      <p:grpSpPr>
+        <a:xfrm>
+          <a:off x="0" y="0"/>
+          <a:ext cx="0" cy="0"/>
+          <a:chOff x="0" y="0"/>
+          <a:chExt cx="0" cy="0"/>
+        </a:xfrm>
+      </p:grpSpPr>
+      <p:sp>
+        <p:nvSpPr>
+          <p:cNvPr id="2" name="Espaço Reservado para Imagem de Slide 1"/>
+          <p:cNvSpPr>
+            <a:spLocks noGrp="1" noRot="1" noChangeAspect="1"/>
+          </p:cNvSpPr>
+          <p:nvPr>
+            <p:ph type="sldImg"/>
+          </p:nvPr>
+        </p:nvSpPr>
+        <p:spPr/>
+      </p:sp>
+      <p:sp>
+        <p:nvSpPr>
+          <p:cNvPr id="3" name="Espaço Reservado para Anotações 2"/>
+          <p:cNvSpPr>
+            <a:spLocks noGrp="1"/>
+          </p:cNvSpPr>
+          <p:nvPr>
+            <p:ph type="body" idx="1"/>
+          </p:nvPr>
+        </p:nvSpPr>
+        <p:spPr/>
+        <p:txBody>
+          <a:bodyPr/>
+          <a:lstStyle/>
+          <a:p>
+            <a:endParaRPr lang="pt-BR" dirty="0"/>
+          </a:p>
+        </p:txBody>
+      </p:sp>
+      <p:sp>
+        <p:nvSpPr>
+          <p:cNvPr id="4" name="Espaço Reservado para Número de Slide 3"/>
+          <p:cNvSpPr>
+            <a:spLocks noGrp="1"/>
+          </p:cNvSpPr>
+          <p:nvPr>
+            <p:ph type="sldNum" sz="quarter" idx="10"/>
+          </p:nvPr>
+        </p:nvSpPr>
+        <p:spPr/>
+        <p:txBody>
+          <a:bodyPr/>
+          <a:lstStyle/>
+          <a:p>
+            <a:fld id="{6446EFFE-B58C-4860-93DF-B33AA5D3FA1B}" type="slidenum">
+              <a:rPr lang="pt-BR" smtClean="0"/>
+              <a:pPr/>
+              <a:t>15</a:t>
+            </a:fld>
+            <a:endParaRPr lang="pt-BR"/>
+          </a:p>
+        </p:txBody>
+      </p:sp>
+    </p:spTree>
+    <p:extLst>
+      <p:ext uri="{BB962C8B-B14F-4D97-AF65-F5344CB8AC3E}">
+        <p14:creationId xmlns:p14="http://schemas.microsoft.com/office/powerpoint/2010/main" val="1365065600"/>
+      </p:ext>
+    </p:extLst>
+  </p:cSld>
+  <p:clrMapOvr>
+    <a:masterClrMapping/>
+  </p:clrMapOvr>
+</p:notes>
+</file>
+
 <file path=ppt/notesSlides/notesSlide2.xml><?xml version="1.0" encoding="utf-8"?>
 <p:notes xmlns:a="http://schemas.openxmlformats.org/drawingml/2006/main" xmlns:r="http://schemas.openxmlformats.org/officeDocument/2006/relationships" xmlns:p="http://schemas.openxmlformats.org/presentationml/2006/main">
   <p:cSld>
@@ -2060,7 +2146,7 @@
               <a:pPr>
                 <a:defRPr/>
               </a:pPr>
-              <a:t>07/11/2011</a:t>
+              <a:t>07/11/11</a:t>
             </a:fld>
             <a:endParaRPr lang="fr-FR" dirty="0"/>
           </a:p>
@@ -2119,7 +2205,7 @@
               <a:pPr>
                 <a:defRPr/>
               </a:pPr>
-              <a:t>‹nº›</a:t>
+              <a:t>‹#›</a:t>
             </a:fld>
             <a:endParaRPr lang="fr-FR" dirty="0"/>
           </a:p>
@@ -2257,7 +2343,7 @@
               <a:pPr>
                 <a:defRPr/>
               </a:pPr>
-              <a:t>07/11/2011</a:t>
+              <a:t>07/11/11</a:t>
             </a:fld>
             <a:endParaRPr lang="fr-FR" dirty="0"/>
           </a:p>
@@ -2316,7 +2402,7 @@
               <a:pPr>
                 <a:defRPr/>
               </a:pPr>
-              <a:t>‹nº›</a:t>
+              <a:t>‹#›</a:t>
             </a:fld>
             <a:endParaRPr lang="fr-FR" dirty="0"/>
           </a:p>
@@ -2464,7 +2550,7 @@
               <a:pPr>
                 <a:defRPr/>
               </a:pPr>
-              <a:t>07/11/2011</a:t>
+              <a:t>07/11/11</a:t>
             </a:fld>
             <a:endParaRPr lang="fr-FR" dirty="0"/>
           </a:p>
@@ -2523,7 +2609,7 @@
               <a:pPr>
                 <a:defRPr/>
               </a:pPr>
-              <a:t>‹nº›</a:t>
+              <a:t>‹#›</a:t>
             </a:fld>
             <a:endParaRPr lang="fr-FR" dirty="0"/>
           </a:p>
@@ -2661,7 +2747,7 @@
               <a:pPr>
                 <a:defRPr/>
               </a:pPr>
-              <a:t>07/11/2011</a:t>
+              <a:t>07/11/11</a:t>
             </a:fld>
             <a:endParaRPr lang="fr-FR" dirty="0"/>
           </a:p>
@@ -2720,7 +2806,7 @@
               <a:pPr>
                 <a:defRPr/>
               </a:pPr>
-              <a:t>‹nº›</a:t>
+              <a:t>‹#›</a:t>
             </a:fld>
             <a:endParaRPr lang="fr-FR" dirty="0"/>
           </a:p>
@@ -2934,7 +3020,7 @@
               <a:pPr>
                 <a:defRPr/>
               </a:pPr>
-              <a:t>07/11/2011</a:t>
+              <a:t>07/11/11</a:t>
             </a:fld>
             <a:endParaRPr lang="fr-FR" dirty="0"/>
           </a:p>
@@ -2993,7 +3079,7 @@
               <a:pPr>
                 <a:defRPr/>
               </a:pPr>
-              <a:t>‹nº›</a:t>
+              <a:t>‹#›</a:t>
             </a:fld>
             <a:endParaRPr lang="fr-FR" dirty="0"/>
           </a:p>
@@ -3249,7 +3335,7 @@
               <a:pPr>
                 <a:defRPr/>
               </a:pPr>
-              <a:t>07/11/2011</a:t>
+              <a:t>07/11/11</a:t>
             </a:fld>
             <a:endParaRPr lang="fr-FR" dirty="0"/>
           </a:p>
@@ -3308,7 +3394,7 @@
               <a:pPr>
                 <a:defRPr/>
               </a:pPr>
-              <a:t>‹nº›</a:t>
+              <a:t>‹#›</a:t>
             </a:fld>
             <a:endParaRPr lang="fr-FR" dirty="0"/>
           </a:p>
@@ -3698,7 +3784,7 @@
               <a:pPr>
                 <a:defRPr/>
               </a:pPr>
-              <a:t>07/11/2011</a:t>
+              <a:t>07/11/11</a:t>
             </a:fld>
             <a:endParaRPr lang="fr-FR" dirty="0"/>
           </a:p>
@@ -3757,7 +3843,7 @@
               <a:pPr>
                 <a:defRPr/>
               </a:pPr>
-              <a:t>‹nº›</a:t>
+              <a:t>‹#›</a:t>
             </a:fld>
             <a:endParaRPr lang="fr-FR" dirty="0"/>
           </a:p>
@@ -3843,7 +3929,7 @@
               <a:pPr>
                 <a:defRPr/>
               </a:pPr>
-              <a:t>07/11/2011</a:t>
+              <a:t>07/11/11</a:t>
             </a:fld>
             <a:endParaRPr lang="fr-FR" dirty="0"/>
           </a:p>
@@ -3902,7 +3988,7 @@
               <a:pPr>
                 <a:defRPr/>
               </a:pPr>
-              <a:t>‹nº›</a:t>
+              <a:t>‹#›</a:t>
             </a:fld>
             <a:endParaRPr lang="fr-FR" dirty="0"/>
           </a:p>
@@ -3965,7 +4051,7 @@
               <a:pPr>
                 <a:defRPr/>
               </a:pPr>
-              <a:t>07/11/2011</a:t>
+              <a:t>07/11/11</a:t>
             </a:fld>
             <a:endParaRPr lang="fr-FR" dirty="0"/>
           </a:p>
@@ -4024,7 +4110,7 @@
               <a:pPr>
                 <a:defRPr/>
               </a:pPr>
-              <a:t>‹nº›</a:t>
+              <a:t>‹#›</a:t>
             </a:fld>
             <a:endParaRPr lang="fr-FR" dirty="0"/>
           </a:p>
@@ -4269,7 +4355,7 @@
               <a:pPr>
                 <a:defRPr/>
               </a:pPr>
-              <a:t>07/11/2011</a:t>
+              <a:t>07/11/11</a:t>
             </a:fld>
             <a:endParaRPr lang="fr-FR" dirty="0"/>
           </a:p>
@@ -4328,7 +4414,7 @@
               <a:pPr>
                 <a:defRPr/>
               </a:pPr>
-              <a:t>‹nº›</a:t>
+              <a:t>‹#›</a:t>
             </a:fld>
             <a:endParaRPr lang="fr-FR" dirty="0"/>
           </a:p>
@@ -4556,7 +4642,7 @@
               <a:pPr>
                 <a:defRPr/>
               </a:pPr>
-              <a:t>07/11/2011</a:t>
+              <a:t>07/11/11</a:t>
             </a:fld>
             <a:endParaRPr lang="fr-FR" dirty="0"/>
           </a:p>
@@ -4615,7 +4701,7 @@
               <a:pPr>
                 <a:defRPr/>
               </a:pPr>
-              <a:t>‹nº›</a:t>
+              <a:t>‹#›</a:t>
             </a:fld>
             <a:endParaRPr lang="fr-FR" dirty="0"/>
           </a:p>
@@ -4679,14 +4765,14 @@
             <a:noFill/>
           </a:ln>
           <a:extLst>
-            <a:ext uri="{909E8E84-426E-40DD-AFC4-6F175D3DCCD1}">
+            <a:ext uri="{909E8E84-426E-40dd-AFC4-6F175D3DCCD1}">
               <a14:hiddenFill xmlns:a14="http://schemas.microsoft.com/office/drawing/2010/main">
                 <a:solidFill>
                   <a:srgbClr val="FFFFFF"/>
                 </a:solidFill>
               </a14:hiddenFill>
             </a:ext>
-            <a:ext uri="{91240B29-F687-4F45-9708-019B960494DF}">
+            <a:ext uri="{91240B29-F687-4f45-9708-019B960494DF}">
               <a14:hiddenLine xmlns:a14="http://schemas.microsoft.com/office/drawing/2010/main" w="9525">
                 <a:solidFill>
                   <a:srgbClr val="000000"/>
@@ -4737,14 +4823,14 @@
             <a:noFill/>
           </a:ln>
           <a:extLst>
-            <a:ext uri="{909E8E84-426E-40DD-AFC4-6F175D3DCCD1}">
+            <a:ext uri="{909E8E84-426E-40dd-AFC4-6F175D3DCCD1}">
               <a14:hiddenFill xmlns:a14="http://schemas.microsoft.com/office/drawing/2010/main">
                 <a:solidFill>
                   <a:srgbClr val="FFFFFF"/>
                 </a:solidFill>
               </a14:hiddenFill>
             </a:ext>
-            <a:ext uri="{91240B29-F687-4F45-9708-019B960494DF}">
+            <a:ext uri="{91240B29-F687-4f45-9708-019B960494DF}">
               <a14:hiddenLine xmlns:a14="http://schemas.microsoft.com/office/drawing/2010/main" w="9525">
                 <a:solidFill>
                   <a:srgbClr val="000000"/>
@@ -4848,7 +4934,7 @@
               <a:pPr>
                 <a:defRPr/>
               </a:pPr>
-              <a:t>07/11/2011</a:t>
+              <a:t>07/11/11</a:t>
             </a:fld>
             <a:endParaRPr lang="fr-FR" dirty="0"/>
           </a:p>
@@ -4949,7 +5035,7 @@
               <a:pPr>
                 <a:defRPr/>
               </a:pPr>
-              <a:t>‹nº›</a:t>
+              <a:t>‹#›</a:t>
             </a:fld>
             <a:endParaRPr lang="fr-FR" dirty="0"/>
           </a:p>
@@ -5958,7 +6044,7 @@
   <p:timing>
     <p:tnLst>
       <p:par>
-        <p:cTn id="1" dur="indefinite" restart="never" nodeType="tmRoot"/>
+        <p:cTn xmlns:p14="http://schemas.microsoft.com/office/powerpoint/2010/main" id="1" dur="indefinite" restart="never" nodeType="tmRoot"/>
       </p:par>
     </p:tnLst>
   </p:timing>
@@ -6102,7 +6188,7 @@
   <p:timing>
     <p:tnLst>
       <p:par>
-        <p:cTn id="1" dur="indefinite" restart="never" nodeType="tmRoot"/>
+        <p:cTn xmlns:p14="http://schemas.microsoft.com/office/powerpoint/2010/main" id="1" dur="indefinite" restart="never" nodeType="tmRoot"/>
       </p:par>
     </p:tnLst>
   </p:timing>
@@ -6138,70 +6224,187 @@
           <a:chExt cx="0" cy="0"/>
         </a:xfrm>
       </p:grpSpPr>
-      <p:pic>
-        <p:nvPicPr>
-          <p:cNvPr id="5122" name="Picture 2"/>
-          <p:cNvPicPr>
-            <a:picLocks noChangeAspect="1" noChangeArrowheads="1"/>
-          </p:cNvPicPr>
+      <p:sp>
+        <p:nvSpPr>
+          <p:cNvPr id="2" name="TextBox 1"/>
+          <p:cNvSpPr txBox="1"/>
           <p:nvPr/>
-        </p:nvPicPr>
-        <p:blipFill>
-          <a:blip r:embed="rId4">
-            <a:extLst>
-              <a:ext uri="{28A0092B-C50C-407E-A947-70E740481C1C}">
-                <a14:useLocalDpi xmlns:a14="http://schemas.microsoft.com/office/drawing/2010/main" val="0"/>
-              </a:ext>
-            </a:extLst>
-          </a:blip>
-          <a:srcRect/>
-          <a:stretch>
-            <a:fillRect/>
-          </a:stretch>
-        </p:blipFill>
-        <p:spPr bwMode="auto">
+        </p:nvSpPr>
+        <p:spPr>
           <a:xfrm>
-            <a:off x="2774539" y="548680"/>
-            <a:ext cx="6035708" cy="5904656"/>
+            <a:off x="4427984" y="404664"/>
+            <a:ext cx="3095719" cy="369332"/>
           </a:xfrm>
           <a:prstGeom prst="rect">
             <a:avLst/>
           </a:prstGeom>
           <a:noFill/>
-          <a:ln>
-            <a:noFill/>
-          </a:ln>
-          <a:effectLst/>
-          <a:extLst>
-            <a:ext uri="{909E8E84-426E-40DD-AFC4-6F175D3DCCD1}">
-              <a14:hiddenFill xmlns:a14="http://schemas.microsoft.com/office/drawing/2010/main">
-                <a:solidFill>
-                  <a:schemeClr val="accent1"/>
-                </a:solidFill>
-              </a14:hiddenFill>
-            </a:ext>
-            <a:ext uri="{91240B29-F687-4F45-9708-019B960494DF}">
-              <a14:hiddenLine xmlns:a14="http://schemas.microsoft.com/office/drawing/2010/main" w="9525">
-                <a:solidFill>
-                  <a:schemeClr val="tx1"/>
-                </a:solidFill>
-                <a:miter lim="800000"/>
-                <a:headEnd/>
-                <a:tailEnd/>
-              </a14:hiddenLine>
-            </a:ext>
-            <a:ext uri="{AF507438-7753-43E0-B8FC-AC1667EBCBE1}">
-              <a14:hiddenEffects xmlns:a14="http://schemas.microsoft.com/office/drawing/2010/main">
-                <a:effectLst>
-                  <a:outerShdw dist="35921" dir="2700000" algn="ctr" rotWithShape="0">
-                    <a:schemeClr val="bg2"/>
-                  </a:outerShdw>
-                </a:effectLst>
-              </a14:hiddenEffects>
-            </a:ext>
-          </a:extLst>
         </p:spPr>
-      </p:pic>
+        <p:txBody>
+          <a:bodyPr wrap="none" rtlCol="0">
+            <a:spAutoFit/>
+          </a:bodyPr>
+          <a:lstStyle/>
+          <a:p>
+            <a:r>
+              <a:rPr lang="pt-BR" b="1" dirty="0"/>
+              <a:t>&lt;Build 1.2&gt; Plano de Teste</a:t>
+            </a:r>
+            <a:r>
+              <a:rPr lang="pt-BR" dirty="0"/>
+              <a:t> </a:t>
+            </a:r>
+            <a:endParaRPr lang="en-US" dirty="0"/>
+          </a:p>
+        </p:txBody>
+      </p:sp>
+      <p:sp>
+        <p:nvSpPr>
+          <p:cNvPr id="3" name="TextBox 2"/>
+          <p:cNvSpPr txBox="1"/>
+          <p:nvPr/>
+        </p:nvSpPr>
+        <p:spPr>
+          <a:xfrm>
+            <a:off x="2627784" y="260648"/>
+            <a:ext cx="6264696" cy="6186310"/>
+          </a:xfrm>
+          <a:prstGeom prst="rect">
+            <a:avLst/>
+          </a:prstGeom>
+          <a:noFill/>
+        </p:spPr>
+        <p:txBody>
+          <a:bodyPr wrap="square" rtlCol="0">
+            <a:spAutoFit/>
+          </a:bodyPr>
+          <a:lstStyle/>
+          <a:p>
+            <a:endParaRPr lang="pt-BR" b="1" dirty="0" smtClean="0"/>
+          </a:p>
+          <a:p>
+            <a:endParaRPr lang="pt-BR" b="1" dirty="0"/>
+          </a:p>
+          <a:p>
+            <a:endParaRPr lang="pt-BR" b="1" dirty="0" smtClean="0"/>
+          </a:p>
+          <a:p>
+            <a:r>
+              <a:rPr lang="pt-BR" b="1" dirty="0" smtClean="0"/>
+              <a:t>Finalidade</a:t>
+            </a:r>
+            <a:endParaRPr lang="pt-BR" dirty="0"/>
+          </a:p>
+          <a:p>
+            <a:r>
+              <a:rPr lang="pt-BR" dirty="0"/>
+              <a:t> </a:t>
+            </a:r>
+          </a:p>
+          <a:p>
+            <a:r>
+              <a:rPr lang="pt-BR" dirty="0" smtClean="0"/>
+              <a:t>	Este </a:t>
+            </a:r>
+            <a:r>
+              <a:rPr lang="pt-BR" dirty="0"/>
+              <a:t>plano de teste se refere ao Projeto </a:t>
+            </a:r>
+            <a:r>
+              <a:rPr lang="pt-BR" dirty="0" err="1"/>
+              <a:t>DotProjectEAP</a:t>
+            </a:r>
+            <a:r>
+              <a:rPr lang="pt-BR" dirty="0"/>
+              <a:t> para testar a comunicação do banco de dados e suas funcionalidades  CRUD </a:t>
+            </a:r>
+            <a:r>
+              <a:rPr lang="pt-BR" dirty="0" smtClean="0"/>
+              <a:t>:</a:t>
+            </a:r>
+          </a:p>
+          <a:p>
+            <a:endParaRPr lang="pt-BR" dirty="0"/>
+          </a:p>
+          <a:p>
+            <a:r>
+              <a:rPr lang="pt-BR" dirty="0" err="1"/>
+              <a:t>Create</a:t>
+            </a:r>
+            <a:r>
+              <a:rPr lang="pt-BR" dirty="0"/>
+              <a:t> Criar ou adicionar novas entradas</a:t>
+            </a:r>
+          </a:p>
+          <a:p>
+            <a:r>
+              <a:rPr lang="pt-BR" dirty="0" err="1"/>
+              <a:t>Retrieved</a:t>
+            </a:r>
+            <a:r>
+              <a:rPr lang="pt-BR" dirty="0"/>
+              <a:t> (</a:t>
+            </a:r>
+            <a:r>
+              <a:rPr lang="pt-BR" dirty="0" err="1"/>
+              <a:t>Read</a:t>
+            </a:r>
+            <a:r>
+              <a:rPr lang="pt-BR" dirty="0"/>
+              <a:t>) Ler, recuperar ou ver entradas existentes</a:t>
+            </a:r>
+          </a:p>
+          <a:p>
+            <a:r>
+              <a:rPr lang="pt-BR" dirty="0"/>
+              <a:t>Update Atualizar ou editar entradas existentes</a:t>
+            </a:r>
+          </a:p>
+          <a:p>
+            <a:r>
+              <a:rPr lang="pt-BR" dirty="0" err="1"/>
+              <a:t>Destroy</a:t>
+            </a:r>
+            <a:r>
+              <a:rPr lang="pt-BR" dirty="0"/>
+              <a:t> (Delete) Remover entradas existentes</a:t>
+            </a:r>
+          </a:p>
+          <a:p>
+            <a:r>
+              <a:rPr lang="pt-BR" dirty="0"/>
+              <a:t> </a:t>
+            </a:r>
+            <a:endParaRPr lang="pt-BR" dirty="0" smtClean="0"/>
+          </a:p>
+          <a:p>
+            <a:endParaRPr lang="pt-BR" dirty="0"/>
+          </a:p>
+          <a:p>
+            <a:r>
+              <a:rPr lang="pt-BR" dirty="0" smtClean="0"/>
+              <a:t>	O </a:t>
+            </a:r>
+            <a:r>
+              <a:rPr lang="pt-BR" dirty="0"/>
+              <a:t>teste será um Teste de Integridade de Dados e de Banco de Dados para garantir as funcionalidades CRUD. </a:t>
+            </a:r>
+          </a:p>
+          <a:p>
+            <a:r>
+              <a:rPr lang="pt-BR" dirty="0" smtClean="0"/>
+              <a:t>	Os </a:t>
+            </a:r>
+            <a:r>
+              <a:rPr lang="pt-BR" dirty="0"/>
+              <a:t>recursos necessários são um computador com servidor web, apache, um banco de dados MySQL, e o código fonte.</a:t>
+            </a:r>
+          </a:p>
+          <a:p>
+            <a:endParaRPr lang="en-US" dirty="0"/>
+          </a:p>
+        </p:txBody>
+      </p:sp>
     </p:spTree>
     <p:extLst>
       <p:ext uri="{BB962C8B-B14F-4D97-AF65-F5344CB8AC3E}">
@@ -6227,7 +6430,7 @@
   <p:timing>
     <p:tnLst>
       <p:par>
-        <p:cTn id="1" dur="indefinite" restart="never" nodeType="tmRoot"/>
+        <p:cTn xmlns:p14="http://schemas.microsoft.com/office/powerpoint/2010/main" id="1" dur="indefinite" restart="never" nodeType="tmRoot"/>
       </p:par>
     </p:tnLst>
   </p:timing>
@@ -6263,70 +6466,111 @@
           <a:chExt cx="0" cy="0"/>
         </a:xfrm>
       </p:grpSpPr>
-      <p:pic>
-        <p:nvPicPr>
-          <p:cNvPr id="6147" name="Picture 3"/>
-          <p:cNvPicPr>
-            <a:picLocks noChangeAspect="1" noChangeArrowheads="1"/>
-          </p:cNvPicPr>
+      <p:sp>
+        <p:nvSpPr>
+          <p:cNvPr id="2" name="TextBox 1"/>
+          <p:cNvSpPr txBox="1"/>
           <p:nvPr/>
-        </p:nvPicPr>
-        <p:blipFill>
-          <a:blip r:embed="rId4">
-            <a:extLst>
-              <a:ext uri="{28A0092B-C50C-407E-A947-70E740481C1C}">
-                <a14:useLocalDpi xmlns:a14="http://schemas.microsoft.com/office/drawing/2010/main" val="0"/>
-              </a:ext>
-            </a:extLst>
-          </a:blip>
-          <a:srcRect/>
-          <a:stretch>
-            <a:fillRect/>
-          </a:stretch>
-        </p:blipFill>
-        <p:spPr bwMode="auto">
+        </p:nvSpPr>
+        <p:spPr>
           <a:xfrm>
-            <a:off x="2339753" y="1381818"/>
-            <a:ext cx="6804248" cy="4063406"/>
+            <a:off x="2219287" y="188640"/>
+            <a:ext cx="6912768" cy="4801315"/>
           </a:xfrm>
           <a:prstGeom prst="rect">
             <a:avLst/>
           </a:prstGeom>
           <a:noFill/>
-          <a:ln>
-            <a:noFill/>
-          </a:ln>
-          <a:effectLst/>
-          <a:extLst>
-            <a:ext uri="{909E8E84-426E-40DD-AFC4-6F175D3DCCD1}">
-              <a14:hiddenFill xmlns:a14="http://schemas.microsoft.com/office/drawing/2010/main">
-                <a:solidFill>
-                  <a:schemeClr val="accent1"/>
-                </a:solidFill>
-              </a14:hiddenFill>
-            </a:ext>
-            <a:ext uri="{91240B29-F687-4F45-9708-019B960494DF}">
-              <a14:hiddenLine xmlns:a14="http://schemas.microsoft.com/office/drawing/2010/main" w="9525">
-                <a:solidFill>
-                  <a:schemeClr val="tx1"/>
-                </a:solidFill>
-                <a:miter lim="800000"/>
-                <a:headEnd/>
-                <a:tailEnd/>
-              </a14:hiddenLine>
-            </a:ext>
-            <a:ext uri="{AF507438-7753-43E0-B8FC-AC1667EBCBE1}">
-              <a14:hiddenEffects xmlns:a14="http://schemas.microsoft.com/office/drawing/2010/main">
-                <a:effectLst>
-                  <a:outerShdw dist="35921" dir="2700000" algn="ctr" rotWithShape="0">
-                    <a:schemeClr val="bg2"/>
-                  </a:outerShdw>
-                </a:effectLst>
-              </a14:hiddenEffects>
-            </a:ext>
-          </a:extLst>
         </p:spPr>
-      </p:pic>
+        <p:txBody>
+          <a:bodyPr wrap="square" rtlCol="0">
+            <a:spAutoFit/>
+          </a:bodyPr>
+          <a:lstStyle/>
+          <a:p>
+            <a:endParaRPr lang="pt-BR" b="1" dirty="0" smtClean="0"/>
+          </a:p>
+          <a:p>
+            <a:endParaRPr lang="pt-BR" b="1" dirty="0"/>
+          </a:p>
+          <a:p>
+            <a:r>
+              <a:rPr lang="pt-BR" b="1" dirty="0" smtClean="0"/>
+              <a:t>Escopo</a:t>
+            </a:r>
+            <a:endParaRPr lang="pt-BR" dirty="0"/>
+          </a:p>
+          <a:p>
+            <a:r>
+              <a:rPr lang="pt-BR" b="1" dirty="0"/>
+              <a:t> </a:t>
+            </a:r>
+            <a:endParaRPr lang="pt-BR" dirty="0"/>
+          </a:p>
+          <a:p>
+            <a:r>
+              <a:rPr lang="pt-BR" dirty="0"/>
+              <a:t>	O teste a ser realizado é  um Teste de Integridade de Dados e de Banco de Dados, este teste servirá para garantir que as funcionalidades CRUD funcionem de maneira correta </a:t>
+            </a:r>
+          </a:p>
+          <a:p>
+            <a:endParaRPr lang="pt-BR" b="1" dirty="0"/>
+          </a:p>
+          <a:p>
+            <a:endParaRPr lang="pt-BR" b="1" dirty="0" smtClean="0"/>
+          </a:p>
+          <a:p>
+            <a:r>
+              <a:rPr lang="pt-BR" b="1" dirty="0" smtClean="0"/>
+              <a:t>Missão </a:t>
+            </a:r>
+            <a:r>
+              <a:rPr lang="pt-BR" b="1" dirty="0"/>
+              <a:t>de </a:t>
+            </a:r>
+            <a:r>
+              <a:rPr lang="pt-BR" b="1" dirty="0" smtClean="0"/>
+              <a:t>Avaliação</a:t>
+            </a:r>
+          </a:p>
+          <a:p>
+            <a:endParaRPr lang="pt-BR" dirty="0"/>
+          </a:p>
+          <a:p>
+            <a:pPr lvl="0"/>
+            <a:r>
+              <a:rPr lang="pt-BR" dirty="0" smtClean="0"/>
+              <a:t>	Localizar </a:t>
+            </a:r>
+            <a:r>
+              <a:rPr lang="pt-BR" dirty="0"/>
+              <a:t>o maior número de erros possíveis.</a:t>
+            </a:r>
+          </a:p>
+          <a:p>
+            <a:r>
+              <a:rPr lang="pt-BR" dirty="0"/>
+              <a:t> </a:t>
+            </a:r>
+          </a:p>
+          <a:p>
+            <a:pPr lvl="0"/>
+            <a:r>
+              <a:rPr lang="pt-BR" dirty="0" smtClean="0"/>
+              <a:t>	Verificar </a:t>
+            </a:r>
+            <a:r>
+              <a:rPr lang="pt-BR" dirty="0"/>
+              <a:t>se a comunicação entre a interface e o banco de dados funciona corretamente. Se as funcionalidades CRUD que implementadas pela interface foram armazenadas no banco de </a:t>
+            </a:r>
+            <a:r>
+              <a:rPr lang="pt-BR" dirty="0" smtClean="0"/>
+              <a:t>dados</a:t>
+            </a:r>
+            <a:endParaRPr lang="pt-BR" dirty="0"/>
+          </a:p>
+        </p:txBody>
+      </p:sp>
     </p:spTree>
     <p:extLst>
       <p:ext uri="{BB962C8B-B14F-4D97-AF65-F5344CB8AC3E}">
@@ -6352,7 +6596,7 @@
   <p:timing>
     <p:tnLst>
       <p:par>
-        <p:cTn id="1" dur="indefinite" restart="never" nodeType="tmRoot"/>
+        <p:cTn xmlns:p14="http://schemas.microsoft.com/office/powerpoint/2010/main" id="1" dur="indefinite" restart="never" nodeType="tmRoot"/>
       </p:par>
     </p:tnLst>
   </p:timing>
@@ -6365,7 +6609,7 @@
     <p:bg>
       <p:bgPr>
         <a:blipFill dpi="0" rotWithShape="0">
-          <a:blip r:embed="rId3" cstate="print"/>
+          <a:blip r:embed="rId4" cstate="print"/>
           <a:srcRect/>
           <a:stretch>
             <a:fillRect/>
@@ -6388,174 +6632,67 @@
           <a:chExt cx="0" cy="0"/>
         </a:xfrm>
       </p:grpSpPr>
-      <p:sp>
-        <p:nvSpPr>
-          <p:cNvPr id="5" name="Título 4"/>
-          <p:cNvSpPr>
-            <a:spLocks noGrp="1"/>
-          </p:cNvSpPr>
-          <p:nvPr>
-            <p:ph type="title"/>
-          </p:nvPr>
-        </p:nvSpPr>
-        <p:spPr/>
-        <p:txBody>
-          <a:bodyPr/>
-          <a:lstStyle/>
-          <a:p>
-            <a:r>
-              <a:rPr lang="pt-BR" dirty="0" err="1" smtClean="0"/>
-              <a:t>Redmine</a:t>
-            </a:r>
-            <a:endParaRPr lang="pt-BR" dirty="0"/>
-          </a:p>
-        </p:txBody>
-      </p:sp>
-      <p:sp>
-        <p:nvSpPr>
-          <p:cNvPr id="2" name="CaixaDeTexto 1"/>
-          <p:cNvSpPr txBox="1"/>
-          <p:nvPr/>
-        </p:nvSpPr>
-        <p:spPr>
-          <a:xfrm>
-            <a:off x="2771800" y="1916832"/>
-            <a:ext cx="3637534" cy="2677656"/>
-          </a:xfrm>
-          <a:prstGeom prst="rect">
-            <a:avLst/>
-          </a:prstGeom>
-          <a:noFill/>
-        </p:spPr>
-        <p:txBody>
-          <a:bodyPr wrap="none" rtlCol="0">
-            <a:spAutoFit/>
-          </a:bodyPr>
-          <a:lstStyle/>
-          <a:p>
-            <a:pPr marL="457200" indent="-457200">
-              <a:buFont typeface="Arial" pitchFamily="34" charset="0"/>
-              <a:buChar char="•"/>
-            </a:pPr>
-            <a:r>
-              <a:rPr lang="pt-BR" sz="2800" dirty="0" smtClean="0"/>
-              <a:t>Requisitos</a:t>
-            </a:r>
-          </a:p>
-          <a:p>
-            <a:pPr marL="1371600" lvl="2" indent="-457200">
-              <a:buFont typeface="Arial" pitchFamily="34" charset="0"/>
-              <a:buChar char="•"/>
-            </a:pPr>
-            <a:r>
-              <a:rPr lang="pt-BR" sz="1400" b="1" dirty="0"/>
-              <a:t>Windows XP </a:t>
-            </a:r>
-            <a:r>
-              <a:rPr lang="pt-BR" sz="1400" b="1" dirty="0" smtClean="0"/>
-              <a:t>SP2</a:t>
-            </a:r>
-          </a:p>
-          <a:p>
-            <a:pPr marL="1371600" lvl="2" indent="-457200">
-              <a:buFont typeface="Arial" pitchFamily="34" charset="0"/>
-              <a:buChar char="•"/>
-            </a:pPr>
-            <a:r>
-              <a:rPr lang="pt-BR" sz="1400" b="1" dirty="0" smtClean="0"/>
-              <a:t>Apache </a:t>
-            </a:r>
-            <a:r>
-              <a:rPr lang="pt-BR" sz="1400" b="1" dirty="0" err="1" smtClean="0"/>
-              <a:t>Webserver</a:t>
-            </a:r>
-            <a:r>
-              <a:rPr lang="pt-BR" sz="1400" b="1" dirty="0" smtClean="0"/>
-              <a:t> 2.x</a:t>
-            </a:r>
-          </a:p>
-          <a:p>
-            <a:pPr marL="1371600" lvl="2" indent="-457200">
-              <a:buFont typeface="Arial" pitchFamily="34" charset="0"/>
-              <a:buChar char="•"/>
-            </a:pPr>
-            <a:r>
-              <a:rPr lang="pt-BR" sz="1400" b="1" dirty="0" err="1" smtClean="0"/>
-              <a:t>One</a:t>
-            </a:r>
-            <a:r>
-              <a:rPr lang="pt-BR" sz="1400" b="1" dirty="0" smtClean="0"/>
-              <a:t>-Click </a:t>
-            </a:r>
-            <a:r>
-              <a:rPr lang="pt-BR" sz="1400" b="1" dirty="0" err="1"/>
-              <a:t>Ruby</a:t>
-            </a:r>
-            <a:r>
-              <a:rPr lang="pt-BR" sz="1400" b="1" dirty="0"/>
-              <a:t> </a:t>
-            </a:r>
-            <a:r>
-              <a:rPr lang="pt-BR" sz="1400" b="1" dirty="0" smtClean="0"/>
-              <a:t>Installer</a:t>
-            </a:r>
-            <a:endParaRPr lang="pt-BR" sz="1400" dirty="0"/>
-          </a:p>
-          <a:p>
-            <a:pPr marL="1371600" lvl="2" indent="-457200">
-              <a:buFont typeface="Arial" pitchFamily="34" charset="0"/>
-              <a:buChar char="•"/>
-            </a:pPr>
-            <a:r>
-              <a:rPr lang="pt-BR" sz="1400" b="1" dirty="0" smtClean="0"/>
-              <a:t>MySQL</a:t>
-            </a:r>
-          </a:p>
-          <a:p>
-            <a:pPr marL="1371600" lvl="2" indent="-457200">
-              <a:buFont typeface="Arial" pitchFamily="34" charset="0"/>
-              <a:buChar char="•"/>
-            </a:pPr>
-            <a:r>
-              <a:rPr lang="pt-BR" sz="1400" b="1" dirty="0" err="1" smtClean="0"/>
-              <a:t>Redmine</a:t>
-            </a:r>
-            <a:endParaRPr lang="pt-BR" sz="1400" b="1" dirty="0" smtClean="0"/>
-          </a:p>
-          <a:p>
-            <a:pPr marL="1371600" lvl="2" indent="-457200">
-              <a:buFont typeface="Arial" pitchFamily="34" charset="0"/>
-              <a:buChar char="•"/>
-            </a:pPr>
-            <a:endParaRPr lang="pt-BR" sz="1400" dirty="0" smtClean="0"/>
-          </a:p>
-          <a:p>
-            <a:pPr marL="457200" indent="-457200">
-              <a:buFont typeface="Arial" pitchFamily="34" charset="0"/>
-              <a:buChar char="•"/>
-            </a:pPr>
-            <a:r>
-              <a:rPr lang="pt-BR" sz="2800" dirty="0" smtClean="0"/>
-              <a:t>Dificuldades</a:t>
-            </a:r>
-          </a:p>
-          <a:p>
-            <a:pPr marL="457200" indent="-457200">
-              <a:buFont typeface="Arial" pitchFamily="34" charset="0"/>
-              <a:buChar char="•"/>
-            </a:pPr>
-            <a:r>
-              <a:rPr lang="pt-BR" sz="2800" dirty="0" smtClean="0"/>
-              <a:t>Instalação</a:t>
-            </a:r>
-            <a:endParaRPr lang="pt-BR" sz="2800" dirty="0"/>
-          </a:p>
-        </p:txBody>
-      </p:sp>
+      <p:graphicFrame>
+        <p:nvGraphicFramePr>
+          <p:cNvPr id="4" name="Object 3"/>
+          <p:cNvGraphicFramePr>
+            <a:graphicFrameLocks noChangeAspect="1"/>
+          </p:cNvGraphicFramePr>
+          <p:nvPr>
+            <p:extLst>
+              <p:ext uri="{D42A27DB-BD31-4B8C-83A1-F6EECF244321}">
+                <p14:modId xmlns:p14="http://schemas.microsoft.com/office/powerpoint/2010/main" val="1996291026"/>
+              </p:ext>
+            </p:extLst>
+          </p:nvPr>
+        </p:nvGraphicFramePr>
+        <p:xfrm>
+          <a:off x="2843808" y="194093"/>
+          <a:ext cx="5760640" cy="6657033"/>
+        </p:xfrm>
+        <a:graphic>
+          <a:graphicData uri="http://schemas.openxmlformats.org/presentationml/2006/ole">
+            <mc:AlternateContent xmlns:mc="http://schemas.openxmlformats.org/markup-compatibility/2006">
+              <mc:Choice xmlns:v="urn:schemas-microsoft-com:vml" Requires="v">
+                <p:oleObj spid="_x0000_s2049" name="Document" r:id="rId5" imgW="5549900" imgH="6413500" progId="Word.Document.12">
+                  <p:embed/>
+                </p:oleObj>
+              </mc:Choice>
+              <mc:Fallback>
+                <p:oleObj name="Document" r:id="rId5" imgW="5549900" imgH="6413500" progId="Word.Document.12">
+                  <p:embed/>
+                  <p:pic>
+                    <p:nvPicPr>
+                      <p:cNvPr id="0" name=""/>
+                      <p:cNvPicPr/>
+                      <p:nvPr/>
+                    </p:nvPicPr>
+                    <p:blipFill>
+                      <a:blip r:embed="rId6"/>
+                      <a:stretch>
+                        <a:fillRect/>
+                      </a:stretch>
+                    </p:blipFill>
+                    <p:spPr>
+                      <a:xfrm>
+                        <a:off x="2843808" y="194093"/>
+                        <a:ext cx="5760640" cy="6657033"/>
+                      </a:xfrm>
+                      <a:prstGeom prst="rect">
+                        <a:avLst/>
+                      </a:prstGeom>
+                    </p:spPr>
+                  </p:pic>
+                </p:oleObj>
+              </mc:Fallback>
+            </mc:AlternateContent>
+          </a:graphicData>
+        </a:graphic>
+      </p:graphicFrame>
     </p:spTree>
     <p:extLst>
       <p:ext uri="{BB962C8B-B14F-4D97-AF65-F5344CB8AC3E}">
-        <p14:creationId xmlns:p14="http://schemas.microsoft.com/office/powerpoint/2010/main" val="3670551304"/>
+        <p14:creationId xmlns:p14="http://schemas.microsoft.com/office/powerpoint/2010/main" val="3750834520"/>
       </p:ext>
     </p:extLst>
   </p:cSld>
@@ -6577,7 +6714,7 @@
   <p:timing>
     <p:tnLst>
       <p:par>
-        <p:cTn id="1" dur="indefinite" restart="never" nodeType="tmRoot"/>
+        <p:cTn xmlns:p14="http://schemas.microsoft.com/office/powerpoint/2010/main" id="1" dur="indefinite" restart="never" nodeType="tmRoot"/>
       </p:par>
     </p:tnLst>
   </p:timing>
@@ -6629,6 +6766,231 @@
           <a:lstStyle/>
           <a:p>
             <a:r>
+              <a:rPr lang="pt-BR" dirty="0" err="1" smtClean="0"/>
+              <a:t>Redmine</a:t>
+            </a:r>
+            <a:endParaRPr lang="pt-BR" dirty="0"/>
+          </a:p>
+        </p:txBody>
+      </p:sp>
+      <p:sp>
+        <p:nvSpPr>
+          <p:cNvPr id="2" name="CaixaDeTexto 1"/>
+          <p:cNvSpPr txBox="1"/>
+          <p:nvPr/>
+        </p:nvSpPr>
+        <p:spPr>
+          <a:xfrm>
+            <a:off x="2771800" y="1916832"/>
+            <a:ext cx="3637534" cy="2677656"/>
+          </a:xfrm>
+          <a:prstGeom prst="rect">
+            <a:avLst/>
+          </a:prstGeom>
+          <a:noFill/>
+        </p:spPr>
+        <p:txBody>
+          <a:bodyPr wrap="none" rtlCol="0">
+            <a:spAutoFit/>
+          </a:bodyPr>
+          <a:lstStyle/>
+          <a:p>
+            <a:pPr marL="457200" indent="-457200">
+              <a:buFont typeface="Arial" pitchFamily="34" charset="0"/>
+              <a:buChar char="•"/>
+            </a:pPr>
+            <a:r>
+              <a:rPr lang="pt-BR" sz="2800" dirty="0" smtClean="0"/>
+              <a:t>Requisitos</a:t>
+            </a:r>
+          </a:p>
+          <a:p>
+            <a:pPr marL="1371600" lvl="2" indent="-457200">
+              <a:buFont typeface="Arial" pitchFamily="34" charset="0"/>
+              <a:buChar char="•"/>
+            </a:pPr>
+            <a:r>
+              <a:rPr lang="pt-BR" sz="1400" b="1" dirty="0"/>
+              <a:t>Windows XP </a:t>
+            </a:r>
+            <a:r>
+              <a:rPr lang="pt-BR" sz="1400" b="1" dirty="0" smtClean="0"/>
+              <a:t>SP2</a:t>
+            </a:r>
+          </a:p>
+          <a:p>
+            <a:pPr marL="1371600" lvl="2" indent="-457200">
+              <a:buFont typeface="Arial" pitchFamily="34" charset="0"/>
+              <a:buChar char="•"/>
+            </a:pPr>
+            <a:r>
+              <a:rPr lang="pt-BR" sz="1400" b="1" dirty="0" smtClean="0"/>
+              <a:t>Apache </a:t>
+            </a:r>
+            <a:r>
+              <a:rPr lang="pt-BR" sz="1400" b="1" dirty="0" err="1" smtClean="0"/>
+              <a:t>Webserver</a:t>
+            </a:r>
+            <a:r>
+              <a:rPr lang="pt-BR" sz="1400" b="1" dirty="0" smtClean="0"/>
+              <a:t> 2.x</a:t>
+            </a:r>
+          </a:p>
+          <a:p>
+            <a:pPr marL="1371600" lvl="2" indent="-457200">
+              <a:buFont typeface="Arial" pitchFamily="34" charset="0"/>
+              <a:buChar char="•"/>
+            </a:pPr>
+            <a:r>
+              <a:rPr lang="pt-BR" sz="1400" b="1" dirty="0" err="1" smtClean="0"/>
+              <a:t>One</a:t>
+            </a:r>
+            <a:r>
+              <a:rPr lang="pt-BR" sz="1400" b="1" dirty="0" smtClean="0"/>
+              <a:t>-Click </a:t>
+            </a:r>
+            <a:r>
+              <a:rPr lang="pt-BR" sz="1400" b="1" dirty="0" err="1"/>
+              <a:t>Ruby</a:t>
+            </a:r>
+            <a:r>
+              <a:rPr lang="pt-BR" sz="1400" b="1" dirty="0"/>
+              <a:t> </a:t>
+            </a:r>
+            <a:r>
+              <a:rPr lang="pt-BR" sz="1400" b="1" dirty="0" smtClean="0"/>
+              <a:t>Installer</a:t>
+            </a:r>
+            <a:endParaRPr lang="pt-BR" sz="1400" dirty="0"/>
+          </a:p>
+          <a:p>
+            <a:pPr marL="1371600" lvl="2" indent="-457200">
+              <a:buFont typeface="Arial" pitchFamily="34" charset="0"/>
+              <a:buChar char="•"/>
+            </a:pPr>
+            <a:r>
+              <a:rPr lang="pt-BR" sz="1400" b="1" dirty="0" smtClean="0"/>
+              <a:t>MySQL</a:t>
+            </a:r>
+          </a:p>
+          <a:p>
+            <a:pPr marL="1371600" lvl="2" indent="-457200">
+              <a:buFont typeface="Arial" pitchFamily="34" charset="0"/>
+              <a:buChar char="•"/>
+            </a:pPr>
+            <a:r>
+              <a:rPr lang="pt-BR" sz="1400" b="1" dirty="0" err="1" smtClean="0"/>
+              <a:t>Redmine</a:t>
+            </a:r>
+            <a:endParaRPr lang="pt-BR" sz="1400" b="1" dirty="0" smtClean="0"/>
+          </a:p>
+          <a:p>
+            <a:pPr marL="1371600" lvl="2" indent="-457200">
+              <a:buFont typeface="Arial" pitchFamily="34" charset="0"/>
+              <a:buChar char="•"/>
+            </a:pPr>
+            <a:endParaRPr lang="pt-BR" sz="1400" dirty="0" smtClean="0"/>
+          </a:p>
+          <a:p>
+            <a:pPr marL="457200" indent="-457200">
+              <a:buFont typeface="Arial" pitchFamily="34" charset="0"/>
+              <a:buChar char="•"/>
+            </a:pPr>
+            <a:r>
+              <a:rPr lang="pt-BR" sz="2800" dirty="0" smtClean="0"/>
+              <a:t>Dificuldades</a:t>
+            </a:r>
+          </a:p>
+          <a:p>
+            <a:pPr marL="457200" indent="-457200">
+              <a:buFont typeface="Arial" pitchFamily="34" charset="0"/>
+              <a:buChar char="•"/>
+            </a:pPr>
+            <a:r>
+              <a:rPr lang="pt-BR" sz="2800" dirty="0" smtClean="0"/>
+              <a:t>Instalação</a:t>
+            </a:r>
+            <a:endParaRPr lang="pt-BR" sz="2800" dirty="0"/>
+          </a:p>
+        </p:txBody>
+      </p:sp>
+    </p:spTree>
+    <p:extLst>
+      <p:ext uri="{BB962C8B-B14F-4D97-AF65-F5344CB8AC3E}">
+        <p14:creationId xmlns:p14="http://schemas.microsoft.com/office/powerpoint/2010/main" val="3670551304"/>
+      </p:ext>
+    </p:extLst>
+  </p:cSld>
+  <p:clrMapOvr>
+    <a:masterClrMapping/>
+  </p:clrMapOvr>
+  <mc:AlternateContent xmlns:mc="http://schemas.openxmlformats.org/markup-compatibility/2006" xmlns:p14="http://schemas.microsoft.com/office/powerpoint/2010/main">
+    <mc:Choice Requires="p14">
+      <p:transition spd="slow" p14:dur="1600">
+        <p14:conveyor dir="l"/>
+      </p:transition>
+    </mc:Choice>
+    <mc:Fallback xmlns="">
+      <p:transition spd="slow">
+        <p:fade/>
+      </p:transition>
+    </mc:Fallback>
+  </mc:AlternateContent>
+  <p:timing>
+    <p:tnLst>
+      <p:par>
+        <p:cTn xmlns:p14="http://schemas.microsoft.com/office/powerpoint/2010/main" id="1" dur="indefinite" restart="never" nodeType="tmRoot"/>
+      </p:par>
+    </p:tnLst>
+  </p:timing>
+</p:sld>
+</file>
+
+<file path=ppt/slides/slide15.xml><?xml version="1.0" encoding="utf-8"?>
+<p:sld xmlns:a="http://schemas.openxmlformats.org/drawingml/2006/main" xmlns:r="http://schemas.openxmlformats.org/officeDocument/2006/relationships" xmlns:p="http://schemas.openxmlformats.org/presentationml/2006/main">
+  <p:cSld>
+    <p:bg>
+      <p:bgPr>
+        <a:blipFill dpi="0" rotWithShape="0">
+          <a:blip r:embed="rId3" cstate="print"/>
+          <a:srcRect/>
+          <a:stretch>
+            <a:fillRect/>
+          </a:stretch>
+        </a:blipFill>
+        <a:effectLst/>
+      </p:bgPr>
+    </p:bg>
+    <p:spTree>
+      <p:nvGrpSpPr>
+        <p:cNvPr id="1" name=""/>
+        <p:cNvGrpSpPr/>
+        <p:nvPr/>
+      </p:nvGrpSpPr>
+      <p:grpSpPr>
+        <a:xfrm>
+          <a:off x="0" y="0"/>
+          <a:ext cx="0" cy="0"/>
+          <a:chOff x="0" y="0"/>
+          <a:chExt cx="0" cy="0"/>
+        </a:xfrm>
+      </p:grpSpPr>
+      <p:sp>
+        <p:nvSpPr>
+          <p:cNvPr id="5" name="Título 4"/>
+          <p:cNvSpPr>
+            <a:spLocks noGrp="1"/>
+          </p:cNvSpPr>
+          <p:nvPr>
+            <p:ph type="title"/>
+          </p:nvPr>
+        </p:nvSpPr>
+        <p:spPr/>
+        <p:txBody>
+          <a:bodyPr/>
+          <a:lstStyle/>
+          <a:p>
+            <a:r>
               <a:rPr lang="pt-BR" dirty="0" smtClean="0"/>
               <a:t>Pesquisas Build3</a:t>
             </a:r>
@@ -6691,7 +7053,7 @@
   <p:timing>
     <p:tnLst>
       <p:par>
-        <p:cTn id="1" dur="indefinite" restart="never" nodeType="tmRoot"/>
+        <p:cTn xmlns:p14="http://schemas.microsoft.com/office/powerpoint/2010/main" id="1" dur="indefinite" restart="never" nodeType="tmRoot"/>
       </p:par>
     </p:tnLst>
   </p:timing>
@@ -6774,10 +7136,6 @@
               <a:rPr lang="pt-BR" sz="2800" dirty="0" smtClean="0"/>
               <a:t>-Valor Agregado</a:t>
             </a:r>
-            <a:r>
-              <a:rPr lang="pt-BR" sz="2800" dirty="0" smtClean="0"/>
-              <a:t/>
-            </a:r>
             <a:br>
               <a:rPr lang="pt-BR" sz="2800" dirty="0" smtClean="0"/>
             </a:br>
@@ -6861,9 +7219,6 @@
               </a:rPr>
               <a:t>Criação da tabela da EAP</a:t>
             </a:r>
-            <a:endParaRPr lang="pt-BR" sz="2800" dirty="0" smtClean="0">
-              <a:latin typeface="+mj-lt"/>
-            </a:endParaRPr>
           </a:p>
           <a:p>
             <a:endParaRPr lang="pt-BR" sz="2800" dirty="0" smtClean="0">
@@ -6889,9 +7244,6 @@
               </a:rPr>
               <a:t> </a:t>
             </a:r>
-            <a:endParaRPr lang="pt-BR" sz="2800" dirty="0" smtClean="0">
-              <a:latin typeface="+mj-lt"/>
-            </a:endParaRPr>
           </a:p>
           <a:p>
             <a:r>
@@ -6904,13 +7256,7 @@
               <a:rPr lang="pt-BR" sz="2800" dirty="0" smtClean="0">
                 <a:latin typeface="+mj-lt"/>
               </a:rPr>
-              <a:t>	</a:t>
-            </a:r>
-            <a:r>
-              <a:rPr lang="pt-BR" sz="2800" dirty="0" smtClean="0">
-                <a:latin typeface="+mj-lt"/>
-              </a:rPr>
-              <a:t>Plano de teste</a:t>
+              <a:t>	Plano de teste</a:t>
             </a:r>
           </a:p>
           <a:p>
@@ -6942,9 +7288,6 @@
               </a:rPr>
               <a:t>Pesquisas</a:t>
             </a:r>
-            <a:endParaRPr lang="pt-BR" sz="2800" b="1" dirty="0" smtClean="0">
-              <a:latin typeface="+mj-lt"/>
-            </a:endParaRPr>
           </a:p>
         </p:txBody>
       </p:sp>
@@ -7009,7 +7352,7 @@
   <p:timing>
     <p:tnLst>
       <p:par>
-        <p:cTn id="1" dur="indefinite" restart="never" nodeType="tmRoot"/>
+        <p:cTn xmlns:p14="http://schemas.microsoft.com/office/powerpoint/2010/main" id="1" dur="indefinite" restart="never" nodeType="tmRoot"/>
       </p:par>
     </p:tnLst>
   </p:timing>
@@ -7103,14 +7446,14 @@
           </a:ln>
           <a:effectLst/>
           <a:extLst>
-            <a:ext uri="{909E8E84-426E-40DD-AFC4-6F175D3DCCD1}">
+            <a:ext uri="{909E8E84-426E-40dd-AFC4-6F175D3DCCD1}">
               <a14:hiddenFill xmlns:a14="http://schemas.microsoft.com/office/drawing/2010/main">
                 <a:solidFill>
                   <a:schemeClr val="accent1"/>
                 </a:solidFill>
               </a14:hiddenFill>
             </a:ext>
-            <a:ext uri="{91240B29-F687-4F45-9708-019B960494DF}">
+            <a:ext uri="{91240B29-F687-4f45-9708-019B960494DF}">
               <a14:hiddenLine xmlns:a14="http://schemas.microsoft.com/office/drawing/2010/main" w="9525">
                 <a:solidFill>
                   <a:schemeClr val="tx1"/>
@@ -7120,7 +7463,7 @@
                 <a:tailEnd/>
               </a14:hiddenLine>
             </a:ext>
-            <a:ext uri="{AF507438-7753-43E0-B8FC-AC1667EBCBE1}">
+            <a:ext uri="{AF507438-7753-43e0-B8FC-AC1667EBCBE1}">
               <a14:hiddenEffects xmlns:a14="http://schemas.microsoft.com/office/drawing/2010/main">
                 <a:effectLst>
                   <a:outerShdw dist="35921" dir="2700000" algn="ctr" rotWithShape="0">
@@ -7157,7 +7500,7 @@
   <p:timing>
     <p:tnLst>
       <p:par>
-        <p:cTn id="1" dur="indefinite" restart="never" nodeType="tmRoot"/>
+        <p:cTn xmlns:p14="http://schemas.microsoft.com/office/powerpoint/2010/main" id="1" dur="indefinite" restart="never" nodeType="tmRoot"/>
       </p:par>
     </p:tnLst>
   </p:timing>
@@ -7251,14 +7594,14 @@
           </a:ln>
           <a:effectLst/>
           <a:extLst>
-            <a:ext uri="{909E8E84-426E-40DD-AFC4-6F175D3DCCD1}">
+            <a:ext uri="{909E8E84-426E-40dd-AFC4-6F175D3DCCD1}">
               <a14:hiddenFill xmlns:a14="http://schemas.microsoft.com/office/drawing/2010/main">
                 <a:solidFill>
                   <a:schemeClr val="accent1"/>
                 </a:solidFill>
               </a14:hiddenFill>
             </a:ext>
-            <a:ext uri="{91240B29-F687-4F45-9708-019B960494DF}">
+            <a:ext uri="{91240B29-F687-4f45-9708-019B960494DF}">
               <a14:hiddenLine xmlns:a14="http://schemas.microsoft.com/office/drawing/2010/main" w="9525">
                 <a:solidFill>
                   <a:schemeClr val="tx1"/>
@@ -7268,7 +7611,7 @@
                 <a:tailEnd/>
               </a14:hiddenLine>
             </a:ext>
-            <a:ext uri="{AF507438-7753-43E0-B8FC-AC1667EBCBE1}">
+            <a:ext uri="{AF507438-7753-43e0-B8FC-AC1667EBCBE1}">
               <a14:hiddenEffects xmlns:a14="http://schemas.microsoft.com/office/drawing/2010/main">
                 <a:effectLst>
                   <a:outerShdw dist="35921" dir="2700000" algn="ctr" rotWithShape="0">
@@ -7335,7 +7678,7 @@
   <p:timing>
     <p:tnLst>
       <p:par>
-        <p:cTn id="1" dur="indefinite" restart="never" nodeType="tmRoot"/>
+        <p:cTn xmlns:p14="http://schemas.microsoft.com/office/powerpoint/2010/main" id="1" dur="indefinite" restart="never" nodeType="tmRoot"/>
       </p:par>
     </p:tnLst>
   </p:timing>
@@ -7429,14 +7772,14 @@
           </a:ln>
           <a:effectLst/>
           <a:extLst>
-            <a:ext uri="{909E8E84-426E-40DD-AFC4-6F175D3DCCD1}">
+            <a:ext uri="{909E8E84-426E-40dd-AFC4-6F175D3DCCD1}">
               <a14:hiddenFill xmlns:a14="http://schemas.microsoft.com/office/drawing/2010/main">
                 <a:solidFill>
                   <a:schemeClr val="accent1"/>
                 </a:solidFill>
               </a14:hiddenFill>
             </a:ext>
-            <a:ext uri="{91240B29-F687-4F45-9708-019B960494DF}">
+            <a:ext uri="{91240B29-F687-4f45-9708-019B960494DF}">
               <a14:hiddenLine xmlns:a14="http://schemas.microsoft.com/office/drawing/2010/main" w="9525">
                 <a:solidFill>
                   <a:schemeClr val="tx1"/>
@@ -7446,7 +7789,7 @@
                 <a:tailEnd/>
               </a14:hiddenLine>
             </a:ext>
-            <a:ext uri="{AF507438-7753-43E0-B8FC-AC1667EBCBE1}">
+            <a:ext uri="{AF507438-7753-43e0-B8FC-AC1667EBCBE1}">
               <a14:hiddenEffects xmlns:a14="http://schemas.microsoft.com/office/drawing/2010/main">
                 <a:effectLst>
                   <a:outerShdw dist="35921" dir="2700000" algn="ctr" rotWithShape="0">
@@ -7493,14 +7836,14 @@
           </a:ln>
           <a:effectLst/>
           <a:extLst>
-            <a:ext uri="{909E8E84-426E-40DD-AFC4-6F175D3DCCD1}">
+            <a:ext uri="{909E8E84-426E-40dd-AFC4-6F175D3DCCD1}">
               <a14:hiddenFill xmlns:a14="http://schemas.microsoft.com/office/drawing/2010/main">
                 <a:solidFill>
                   <a:schemeClr val="accent1"/>
                 </a:solidFill>
               </a14:hiddenFill>
             </a:ext>
-            <a:ext uri="{91240B29-F687-4F45-9708-019B960494DF}">
+            <a:ext uri="{91240B29-F687-4f45-9708-019B960494DF}">
               <a14:hiddenLine xmlns:a14="http://schemas.microsoft.com/office/drawing/2010/main" w="9525">
                 <a:solidFill>
                   <a:schemeClr val="tx1"/>
@@ -7510,7 +7853,7 @@
                 <a:tailEnd/>
               </a14:hiddenLine>
             </a:ext>
-            <a:ext uri="{AF507438-7753-43E0-B8FC-AC1667EBCBE1}">
+            <a:ext uri="{AF507438-7753-43e0-B8FC-AC1667EBCBE1}">
               <a14:hiddenEffects xmlns:a14="http://schemas.microsoft.com/office/drawing/2010/main">
                 <a:effectLst>
                   <a:outerShdw dist="35921" dir="2700000" algn="ctr" rotWithShape="0">
@@ -7547,7 +7890,7 @@
   <p:timing>
     <p:tnLst>
       <p:par>
-        <p:cTn id="1" dur="indefinite" restart="never" nodeType="tmRoot"/>
+        <p:cTn xmlns:p14="http://schemas.microsoft.com/office/powerpoint/2010/main" id="1" dur="indefinite" restart="never" nodeType="tmRoot"/>
       </p:par>
     </p:tnLst>
   </p:timing>
@@ -7641,14 +7984,14 @@
           </a:ln>
           <a:effectLst/>
           <a:extLst>
-            <a:ext uri="{909E8E84-426E-40DD-AFC4-6F175D3DCCD1}">
+            <a:ext uri="{909E8E84-426E-40dd-AFC4-6F175D3DCCD1}">
               <a14:hiddenFill xmlns:a14="http://schemas.microsoft.com/office/drawing/2010/main">
                 <a:solidFill>
                   <a:schemeClr val="accent1"/>
                 </a:solidFill>
               </a14:hiddenFill>
             </a:ext>
-            <a:ext uri="{91240B29-F687-4F45-9708-019B960494DF}">
+            <a:ext uri="{91240B29-F687-4f45-9708-019B960494DF}">
               <a14:hiddenLine xmlns:a14="http://schemas.microsoft.com/office/drawing/2010/main" w="9525">
                 <a:solidFill>
                   <a:schemeClr val="tx1"/>
@@ -7658,7 +8001,7 @@
                 <a:tailEnd/>
               </a14:hiddenLine>
             </a:ext>
-            <a:ext uri="{AF507438-7753-43E0-B8FC-AC1667EBCBE1}">
+            <a:ext uri="{AF507438-7753-43e0-B8FC-AC1667EBCBE1}">
               <a14:hiddenEffects xmlns:a14="http://schemas.microsoft.com/office/drawing/2010/main">
                 <a:effectLst>
                   <a:outerShdw dist="35921" dir="2700000" algn="ctr" rotWithShape="0">
@@ -7695,7 +8038,7 @@
   <p:timing>
     <p:tnLst>
       <p:par>
-        <p:cTn id="1" dur="indefinite" restart="never" nodeType="tmRoot"/>
+        <p:cTn xmlns:p14="http://schemas.microsoft.com/office/powerpoint/2010/main" id="1" dur="indefinite" restart="never" nodeType="tmRoot"/>
       </p:par>
     </p:tnLst>
   </p:timing>
@@ -7789,14 +8132,14 @@
           </a:ln>
           <a:effectLst/>
           <a:extLst>
-            <a:ext uri="{909E8E84-426E-40DD-AFC4-6F175D3DCCD1}">
+            <a:ext uri="{909E8E84-426E-40dd-AFC4-6F175D3DCCD1}">
               <a14:hiddenFill xmlns:a14="http://schemas.microsoft.com/office/drawing/2010/main">
                 <a:solidFill>
                   <a:schemeClr val="accent1"/>
                 </a:solidFill>
               </a14:hiddenFill>
             </a:ext>
-            <a:ext uri="{91240B29-F687-4F45-9708-019B960494DF}">
+            <a:ext uri="{91240B29-F687-4f45-9708-019B960494DF}">
               <a14:hiddenLine xmlns:a14="http://schemas.microsoft.com/office/drawing/2010/main" w="9525">
                 <a:solidFill>
                   <a:schemeClr val="tx1"/>
@@ -7806,7 +8149,7 @@
                 <a:tailEnd/>
               </a14:hiddenLine>
             </a:ext>
-            <a:ext uri="{AF507438-7753-43E0-B8FC-AC1667EBCBE1}">
+            <a:ext uri="{AF507438-7753-43e0-B8FC-AC1667EBCBE1}">
               <a14:hiddenEffects xmlns:a14="http://schemas.microsoft.com/office/drawing/2010/main">
                 <a:effectLst>
                   <a:outerShdw dist="35921" dir="2700000" algn="ctr" rotWithShape="0">
@@ -7917,14 +8260,14 @@
           </a:ln>
           <a:effectLst/>
           <a:extLst>
-            <a:ext uri="{909E8E84-426E-40DD-AFC4-6F175D3DCCD1}">
+            <a:ext uri="{909E8E84-426E-40dd-AFC4-6F175D3DCCD1}">
               <a14:hiddenFill xmlns:a14="http://schemas.microsoft.com/office/drawing/2010/main">
                 <a:solidFill>
                   <a:schemeClr val="accent1"/>
                 </a:solidFill>
               </a14:hiddenFill>
             </a:ext>
-            <a:ext uri="{91240B29-F687-4F45-9708-019B960494DF}">
+            <a:ext uri="{91240B29-F687-4f45-9708-019B960494DF}">
               <a14:hiddenLine xmlns:a14="http://schemas.microsoft.com/office/drawing/2010/main" w="9525">
                 <a:solidFill>
                   <a:schemeClr val="tx1"/>
@@ -7934,7 +8277,7 @@
                 <a:tailEnd/>
               </a14:hiddenLine>
             </a:ext>
-            <a:ext uri="{AF507438-7753-43E0-B8FC-AC1667EBCBE1}">
+            <a:ext uri="{AF507438-7753-43e0-B8FC-AC1667EBCBE1}">
               <a14:hiddenEffects xmlns:a14="http://schemas.microsoft.com/office/drawing/2010/main">
                 <a:effectLst>
                   <a:outerShdw dist="35921" dir="2700000" algn="ctr" rotWithShape="0">
@@ -8027,7 +8370,7 @@
   <p:timing>
     <p:tnLst>
       <p:par>
-        <p:cTn id="1" dur="indefinite" restart="never" nodeType="tmRoot"/>
+        <p:cTn xmlns:p14="http://schemas.microsoft.com/office/powerpoint/2010/main" id="1" dur="indefinite" restart="never" nodeType="tmRoot"/>
       </p:par>
     </p:tnLst>
   </p:timing>
@@ -8171,7 +8514,7 @@
   <p:timing>
     <p:tnLst>
       <p:par>
-        <p:cTn id="1" dur="indefinite" restart="never" nodeType="tmRoot"/>
+        <p:cTn xmlns:p14="http://schemas.microsoft.com/office/powerpoint/2010/main" id="1" dur="indefinite" restart="never" nodeType="tmRoot"/>
       </p:par>
     </p:tnLst>
   </p:timing>
@@ -8315,7 +8658,7 @@
   <p:timing>
     <p:tnLst>
       <p:par>
-        <p:cTn id="1" dur="indefinite" restart="never" nodeType="tmRoot"/>
+        <p:cTn xmlns:p14="http://schemas.microsoft.com/office/powerpoint/2010/main" id="1" dur="indefinite" restart="never" nodeType="tmRoot"/>
       </p:par>
     </p:tnLst>
   </p:timing>

</xml_diff>